<commit_message>
atualiza comentários slide versionamento e validação
</commit_message>
<xml_diff>
--- a/workshop-inova/workshop-inova-20201123.pptx
+++ b/workshop-inova/workshop-inova-20201123.pptx
@@ -1026,11 +1026,7 @@
             </a:r>
             <a:r>
               <a:rPr lang="pt-BR" baseline="0" dirty="0" smtClean="0"/>
-              <a:t> em seus níveis </a:t>
-            </a:r>
-            <a:r>
-              <a:rPr lang="pt-BR" baseline="0" dirty="0" smtClean="0"/>
-              <a:t>diferentes</a:t>
+              <a:t> em seus níveis diferentes</a:t>
             </a:r>
           </a:p>
           <a:p>
@@ -1237,11 +1233,7 @@
             </a:r>
             <a:r>
               <a:rPr lang="pt-BR" baseline="0" dirty="0" smtClean="0"/>
-              <a:t> em seus níveis </a:t>
-            </a:r>
-            <a:r>
-              <a:rPr lang="pt-BR" baseline="0" dirty="0" smtClean="0"/>
-              <a:t>diferentes</a:t>
+              <a:t> em seus níveis diferentes</a:t>
             </a:r>
           </a:p>
           <a:p>
@@ -1584,15 +1576,7 @@
                   <a:srgbClr val="172B4D"/>
                 </a:solidFill>
               </a:rPr>
-              <a:t>CONCEITOS</a:t>
-            </a:r>
-            <a:r>
-              <a:rPr lang="pt-BR" dirty="0" smtClean="0">
-                <a:solidFill>
-                  <a:srgbClr val="172B4D"/>
-                </a:solidFill>
-              </a:rPr>
-              <a:t>:</a:t>
+              <a:t>CONCEITOS:</a:t>
             </a:r>
             <a:r>
               <a:rPr lang="pt-BR" baseline="0" dirty="0" smtClean="0">
@@ -1600,7 +1584,15 @@
                   <a:srgbClr val="172B4D"/>
                 </a:solidFill>
               </a:rPr>
-              <a:t> qualidade</a:t>
+              <a:t> qualidade, especificações, </a:t>
+            </a:r>
+            <a:r>
+              <a:rPr lang="pt-BR" baseline="0" dirty="0" err="1" smtClean="0">
+                <a:solidFill>
+                  <a:srgbClr val="172B4D"/>
+                </a:solidFill>
+              </a:rPr>
+              <a:t>datapackage</a:t>
             </a:r>
             <a:r>
               <a:rPr lang="pt-BR" baseline="0" dirty="0" smtClean="0">
@@ -1608,7 +1600,15 @@
                   <a:srgbClr val="172B4D"/>
                 </a:solidFill>
               </a:rPr>
-              <a:t>, especificações</a:t>
+              <a:t>, </a:t>
+            </a:r>
+            <a:r>
+              <a:rPr lang="pt-BR" baseline="0" dirty="0" err="1" smtClean="0">
+                <a:solidFill>
+                  <a:srgbClr val="172B4D"/>
+                </a:solidFill>
+              </a:rPr>
+              <a:t>frictionless</a:t>
             </a:r>
             <a:r>
               <a:rPr lang="pt-BR" baseline="0" dirty="0" smtClean="0">
@@ -1616,47 +1616,7 @@
                   <a:srgbClr val="172B4D"/>
                 </a:solidFill>
               </a:rPr>
-              <a:t>, </a:t>
-            </a:r>
-            <a:r>
-              <a:rPr lang="pt-BR" baseline="0" dirty="0" err="1" smtClean="0">
-                <a:solidFill>
-                  <a:srgbClr val="172B4D"/>
-                </a:solidFill>
-              </a:rPr>
-              <a:t>datapackage</a:t>
-            </a:r>
-            <a:r>
-              <a:rPr lang="pt-BR" baseline="0" dirty="0" smtClean="0">
-                <a:solidFill>
-                  <a:srgbClr val="172B4D"/>
-                </a:solidFill>
-              </a:rPr>
-              <a:t>, </a:t>
-            </a:r>
-            <a:r>
-              <a:rPr lang="pt-BR" baseline="0" dirty="0" err="1" smtClean="0">
-                <a:solidFill>
-                  <a:srgbClr val="172B4D"/>
-                </a:solidFill>
-              </a:rPr>
-              <a:t>frictionless</a:t>
-            </a:r>
-            <a:r>
-              <a:rPr lang="pt-BR" baseline="0" dirty="0" smtClean="0">
-                <a:solidFill>
-                  <a:srgbClr val="172B4D"/>
-                </a:solidFill>
-              </a:rPr>
-              <a:t> </a:t>
-            </a:r>
-            <a:r>
-              <a:rPr lang="pt-BR" baseline="0" dirty="0" smtClean="0">
-                <a:solidFill>
-                  <a:srgbClr val="172B4D"/>
-                </a:solidFill>
-              </a:rPr>
-              <a:t>data</a:t>
+              <a:t> data</a:t>
             </a:r>
             <a:endParaRPr lang="pt-BR" dirty="0" smtClean="0">
               <a:solidFill>
@@ -1796,19 +1756,7 @@
                 <a:ea typeface="+mn-ea"/>
                 <a:cs typeface="+mn-cs"/>
               </a:rPr>
-              <a:t>LOAD </a:t>
-            </a:r>
-            <a:r>
-              <a:rPr lang="pt-BR" sz="1200" b="0" i="0" kern="1200" dirty="0" smtClean="0">
-                <a:solidFill>
-                  <a:schemeClr val="tx1"/>
-                </a:solidFill>
-                <a:effectLst/>
-                <a:latin typeface="+mn-lt"/>
-                <a:ea typeface="+mn-ea"/>
-                <a:cs typeface="+mn-cs"/>
-              </a:rPr>
-              <a:t>(do HD e da URL)/VALIDATE/DOWNLOAD/UPLOAD</a:t>
+              <a:t>LOAD (do HD e da URL)/VALIDATE/DOWNLOAD/UPLOAD</a:t>
             </a:r>
           </a:p>
           <a:p>
@@ -2342,7 +2290,6 @@
               <a:rPr lang="pt-BR" dirty="0" smtClean="0"/>
               <a:t> CC-BY-SA 3.0 BR &lt;https://www.gov.br/governodigital/pt-br/software-publico/portaria-46.pdf&gt;</a:t>
             </a:r>
-            <a:endParaRPr lang="pt-BR" dirty="0" smtClean="0"/>
           </a:p>
           <a:p>
             <a:endParaRPr lang="pt-BR" sz="1200" b="0" i="0" u="none" strike="noStrike" kern="1200" dirty="0" smtClean="0">
@@ -2570,15 +2517,6 @@
               </a:rPr>
               <a:t>: &lt;https://specs.frictionlessdata.io/patterns/#data-package-version&gt;</a:t>
             </a:r>
-            <a:endParaRPr lang="pt-BR" sz="1200" b="0" i="0" kern="1200" dirty="0" smtClean="0">
-              <a:solidFill>
-                <a:schemeClr val="tx1"/>
-              </a:solidFill>
-              <a:effectLst/>
-              <a:latin typeface="+mn-lt"/>
-              <a:ea typeface="+mn-ea"/>
-              <a:cs typeface="+mn-cs"/>
-            </a:endParaRPr>
           </a:p>
         </p:txBody>
       </p:sp>
@@ -2749,33 +2687,115 @@
           </a:p>
           <a:p>
             <a:r>
-              <a:rPr lang="pt-BR" dirty="0" smtClean="0"/>
-              <a:t>RETOMAR o </a:t>
-            </a:r>
-            <a:r>
-              <a:rPr lang="pt-BR" dirty="0" smtClean="0"/>
-              <a:t>exemplo </a:t>
-            </a:r>
-            <a:r>
-              <a:rPr lang="pt-BR" dirty="0" smtClean="0"/>
-              <a:t>da remuneração</a:t>
-            </a:r>
-            <a:r>
-              <a:rPr lang="pt-BR" baseline="0" dirty="0" smtClean="0"/>
-              <a:t> – leiaute arquivo, mudanças colunas, tipo variáveis, </a:t>
-            </a:r>
-            <a:r>
-              <a:rPr lang="pt-BR" baseline="0" dirty="0" err="1" smtClean="0"/>
-              <a:t>etc</a:t>
-            </a:r>
-            <a:endParaRPr lang="pt-BR" baseline="0" dirty="0" smtClean="0"/>
-          </a:p>
-          <a:p>
-            <a:endParaRPr lang="pt-BR" baseline="0" dirty="0" smtClean="0"/>
-          </a:p>
-          <a:p>
-            <a:r>
-              <a:rPr lang="pt-BR" sz="1200" b="1" i="0" u="none" strike="noStrike" kern="1200" dirty="0" smtClean="0">
+              <a:rPr lang="pt-BR" sz="1200" b="0" i="0" kern="1200" dirty="0" smtClean="0">
+                <a:solidFill>
+                  <a:schemeClr val="tx1"/>
+                </a:solidFill>
+                <a:effectLst/>
+                <a:latin typeface="+mn-lt"/>
+                <a:ea typeface="+mn-ea"/>
+                <a:cs typeface="+mn-cs"/>
+              </a:rPr>
+              <a:t>Link do arquivo para leitura e interpretação das ferramentas online (</a:t>
+            </a:r>
+            <a:r>
+              <a:rPr lang="pt-BR" sz="1200" b="0" i="0" kern="1200" dirty="0" err="1" smtClean="0">
+                <a:solidFill>
+                  <a:schemeClr val="tx1"/>
+                </a:solidFill>
+                <a:effectLst/>
+                <a:latin typeface="+mn-lt"/>
+                <a:ea typeface="+mn-ea"/>
+                <a:cs typeface="+mn-cs"/>
+              </a:rPr>
+              <a:t>datapackage</a:t>
+            </a:r>
+            <a:r>
+              <a:rPr lang="pt-BR" sz="1200" b="0" i="0" kern="1200" dirty="0" smtClean="0">
+                <a:solidFill>
+                  <a:schemeClr val="tx1"/>
+                </a:solidFill>
+                <a:effectLst/>
+                <a:latin typeface="+mn-lt"/>
+                <a:ea typeface="+mn-ea"/>
+                <a:cs typeface="+mn-cs"/>
+              </a:rPr>
+              <a:t> </a:t>
+            </a:r>
+            <a:r>
+              <a:rPr lang="pt-BR" sz="1200" b="0" i="0" kern="1200" dirty="0" err="1" smtClean="0">
+                <a:solidFill>
+                  <a:schemeClr val="tx1"/>
+                </a:solidFill>
+                <a:effectLst/>
+                <a:latin typeface="+mn-lt"/>
+                <a:ea typeface="+mn-ea"/>
+                <a:cs typeface="+mn-cs"/>
+              </a:rPr>
+              <a:t>creator</a:t>
+            </a:r>
+            <a:r>
+              <a:rPr lang="pt-BR" sz="1200" b="0" i="0" kern="1200" dirty="0" smtClean="0">
+                <a:solidFill>
+                  <a:schemeClr val="tx1"/>
+                </a:solidFill>
+                <a:effectLst/>
+                <a:latin typeface="+mn-lt"/>
+                <a:ea typeface="+mn-ea"/>
+                <a:cs typeface="+mn-cs"/>
+              </a:rPr>
+              <a:t> e </a:t>
+            </a:r>
+            <a:r>
+              <a:rPr lang="pt-BR" sz="1200" b="0" i="0" kern="1200" dirty="0" err="1" smtClean="0">
+                <a:solidFill>
+                  <a:schemeClr val="tx1"/>
+                </a:solidFill>
+                <a:effectLst/>
+                <a:latin typeface="+mn-lt"/>
+                <a:ea typeface="+mn-ea"/>
+                <a:cs typeface="+mn-cs"/>
+              </a:rPr>
+              <a:t>goodtables</a:t>
+            </a:r>
+            <a:r>
+              <a:rPr lang="pt-BR" sz="1200" b="0" i="0" kern="1200" dirty="0" smtClean="0">
+                <a:solidFill>
+                  <a:schemeClr val="tx1"/>
+                </a:solidFill>
+                <a:effectLst/>
+                <a:latin typeface="+mn-lt"/>
+                <a:ea typeface="+mn-ea"/>
+                <a:cs typeface="+mn-cs"/>
+              </a:rPr>
+              <a:t>) deve ser sempre o do </a:t>
+            </a:r>
+            <a:r>
+              <a:rPr lang="pt-BR" sz="1200" b="0" i="0" kern="1200" dirty="0" err="1" smtClean="0">
+                <a:solidFill>
+                  <a:schemeClr val="tx1"/>
+                </a:solidFill>
+                <a:effectLst/>
+                <a:latin typeface="+mn-lt"/>
+                <a:ea typeface="+mn-ea"/>
+                <a:cs typeface="+mn-cs"/>
+              </a:rPr>
+              <a:t>raw</a:t>
+            </a:r>
+            <a:r>
+              <a:rPr lang="pt-BR" sz="1200" b="0" i="0" kern="1200" dirty="0" smtClean="0">
+                <a:solidFill>
+                  <a:schemeClr val="tx1"/>
+                </a:solidFill>
+                <a:effectLst/>
+                <a:latin typeface="+mn-lt"/>
+                <a:ea typeface="+mn-ea"/>
+                <a:cs typeface="+mn-cs"/>
+              </a:rPr>
+              <a:t>, </a:t>
+            </a:r>
+            <a:r>
+              <a:rPr lang="pt-BR" sz="1200" b="0" i="0" u="none" strike="noStrike" kern="1200" dirty="0" smtClean="0">
                 <a:solidFill>
                   <a:schemeClr val="tx1"/>
                 </a:solidFill>
@@ -2785,10 +2805,32 @@
                 <a:cs typeface="+mn-cs"/>
                 <a:hlinkClick r:id="rId3"/>
               </a:rPr>
-              <a:t>Especificação do </a:t>
-            </a:r>
-            <a:r>
-              <a:rPr lang="pt-BR" sz="1200" b="1" i="0" u="none" strike="noStrike" kern="1200" dirty="0" err="1" smtClean="0">
+              <a:t>caso contrário há o risco de ser interpretado como HTML em vez de arquivo com formato tabular (CSV)</a:t>
+            </a:r>
+            <a:endParaRPr lang="pt-BR" sz="1200" b="0" i="0" u="none" strike="noStrike" kern="1200" dirty="0" smtClean="0">
+              <a:solidFill>
+                <a:schemeClr val="tx1"/>
+              </a:solidFill>
+              <a:effectLst/>
+              <a:latin typeface="+mn-lt"/>
+              <a:ea typeface="+mn-ea"/>
+              <a:cs typeface="+mn-cs"/>
+            </a:endParaRPr>
+          </a:p>
+          <a:p>
+            <a:endParaRPr lang="pt-BR" sz="1200" b="0" i="0" u="none" strike="noStrike" kern="1200" dirty="0" smtClean="0">
+              <a:solidFill>
+                <a:schemeClr val="tx1"/>
+              </a:solidFill>
+              <a:effectLst/>
+              <a:latin typeface="+mn-lt"/>
+              <a:ea typeface="+mn-ea"/>
+              <a:cs typeface="+mn-cs"/>
+            </a:endParaRPr>
+          </a:p>
+          <a:p>
+            <a:r>
+              <a:rPr lang="pt-BR" sz="1200" b="0" i="0" kern="1200" dirty="0" err="1" smtClean="0">
                 <a:solidFill>
                   <a:schemeClr val="tx1"/>
                 </a:solidFill>
@@ -2796,12 +2838,11 @@
                 <a:latin typeface="+mn-lt"/>
                 <a:ea typeface="+mn-ea"/>
                 <a:cs typeface="+mn-cs"/>
-                <a:hlinkClick r:id="rId3"/>
-              </a:rPr>
-              <a:t>csv</a:t>
-            </a:r>
-            <a:r>
-              <a:rPr lang="pt-BR" sz="1200" b="1" i="0" u="none" strike="noStrike" kern="1200" dirty="0" smtClean="0">
+              </a:rPr>
+              <a:t>Renderização</a:t>
+            </a:r>
+            <a:r>
+              <a:rPr lang="pt-BR" sz="1200" b="0" i="0" kern="1200" dirty="0" smtClean="0">
                 <a:solidFill>
                   <a:schemeClr val="tx1"/>
                 </a:solidFill>
@@ -2810,7 +2851,31 @@
                 <a:ea typeface="+mn-ea"/>
                 <a:cs typeface="+mn-cs"/>
               </a:rPr>
-              <a:t>: </a:t>
+              <a:t> automática de CSV no </a:t>
+            </a:r>
+            <a:r>
+              <a:rPr lang="pt-BR" sz="1200" b="0" i="0" kern="1200" dirty="0" err="1" smtClean="0">
+                <a:solidFill>
+                  <a:schemeClr val="tx1"/>
+                </a:solidFill>
+                <a:effectLst/>
+                <a:latin typeface="+mn-lt"/>
+                <a:ea typeface="+mn-ea"/>
+                <a:cs typeface="+mn-cs"/>
+              </a:rPr>
+              <a:t>github</a:t>
+            </a:r>
+            <a:r>
+              <a:rPr lang="pt-BR" sz="1200" b="0" i="0" kern="1200" dirty="0" smtClean="0">
+                <a:solidFill>
+                  <a:schemeClr val="tx1"/>
+                </a:solidFill>
+                <a:effectLst/>
+                <a:latin typeface="+mn-lt"/>
+                <a:ea typeface="+mn-ea"/>
+                <a:cs typeface="+mn-cs"/>
+              </a:rPr>
+              <a:t>: </a:t>
             </a:r>
             <a:r>
               <a:rPr lang="pt-BR" sz="1200" b="0" i="0" u="none" strike="noStrike" kern="1200" dirty="0" smtClean="0">
@@ -2823,10 +2888,10 @@
                 <a:cs typeface="+mn-cs"/>
                 <a:hlinkClick r:id="rId4"/>
               </a:rPr>
-              <a:t>CSV </a:t>
-            </a:r>
-            <a:r>
-              <a:rPr lang="pt-BR" sz="1200" b="0" i="0" u="none" strike="noStrike" kern="1200" dirty="0" err="1" smtClean="0">
+              <a:t>somente arquivos com vírgulas como separadores</a:t>
+            </a:r>
+            <a:r>
+              <a:rPr lang="pt-BR" sz="1200" b="0" i="0" kern="1200" dirty="0" smtClean="0">
                 <a:solidFill>
                   <a:schemeClr val="tx1"/>
                 </a:solidFill>
@@ -2834,12 +2899,11 @@
                 <a:latin typeface="+mn-lt"/>
                 <a:ea typeface="+mn-ea"/>
                 <a:cs typeface="+mn-cs"/>
-                <a:hlinkClick r:id="rId4"/>
-              </a:rPr>
-              <a:t>dialect</a:t>
-            </a:r>
-            <a:r>
-              <a:rPr lang="pt-BR" sz="1200" b="0" i="0" u="none" strike="noStrike" kern="1200" dirty="0" smtClean="0">
+              </a:rPr>
+              <a:t> permitem o </a:t>
+            </a:r>
+            <a:r>
+              <a:rPr lang="pt-BR" sz="1200" b="0" i="0" kern="1200" dirty="0" err="1" smtClean="0">
                 <a:solidFill>
                   <a:schemeClr val="tx1"/>
                 </a:solidFill>
@@ -2847,12 +2911,11 @@
                 <a:latin typeface="+mn-lt"/>
                 <a:ea typeface="+mn-ea"/>
                 <a:cs typeface="+mn-cs"/>
-                <a:hlinkClick r:id="rId4"/>
-              </a:rPr>
-              <a:t> </a:t>
-            </a:r>
-            <a:r>
-              <a:rPr lang="pt-BR" sz="1200" b="0" i="0" u="none" strike="noStrike" kern="1200" dirty="0" err="1" smtClean="0">
+              </a:rPr>
+              <a:t>github</a:t>
+            </a:r>
+            <a:r>
+              <a:rPr lang="pt-BR" sz="1200" b="0" i="0" kern="1200" dirty="0" smtClean="0">
                 <a:solidFill>
                   <a:schemeClr val="tx1"/>
                 </a:solidFill>
@@ -2860,7 +2923,252 @@
                 <a:latin typeface="+mn-lt"/>
                 <a:ea typeface="+mn-ea"/>
                 <a:cs typeface="+mn-cs"/>
-                <a:hlinkClick r:id="rId4"/>
+              </a:rPr>
+              <a:t> apresentar o arquivo com visualização tabular, similar a que se tem quando se abre o </a:t>
+            </a:r>
+            <a:r>
+              <a:rPr lang="pt-BR" sz="1200" b="0" i="0" kern="1200" dirty="0" err="1" smtClean="0">
+                <a:solidFill>
+                  <a:schemeClr val="tx1"/>
+                </a:solidFill>
+                <a:effectLst/>
+                <a:latin typeface="+mn-lt"/>
+                <a:ea typeface="+mn-ea"/>
+                <a:cs typeface="+mn-cs"/>
+              </a:rPr>
+              <a:t>csv</a:t>
+            </a:r>
+            <a:r>
+              <a:rPr lang="pt-BR" sz="1200" b="0" i="0" kern="1200" dirty="0" smtClean="0">
+                <a:solidFill>
+                  <a:schemeClr val="tx1"/>
+                </a:solidFill>
+                <a:effectLst/>
+                <a:latin typeface="+mn-lt"/>
+                <a:ea typeface="+mn-ea"/>
+                <a:cs typeface="+mn-cs"/>
+              </a:rPr>
+              <a:t> no </a:t>
+            </a:r>
+            <a:r>
+              <a:rPr lang="pt-BR" sz="1200" b="0" i="0" kern="1200" dirty="0" err="1" smtClean="0">
+                <a:solidFill>
+                  <a:schemeClr val="tx1"/>
+                </a:solidFill>
+                <a:effectLst/>
+                <a:latin typeface="+mn-lt"/>
+                <a:ea typeface="+mn-ea"/>
+                <a:cs typeface="+mn-cs"/>
+              </a:rPr>
+              <a:t>excell</a:t>
+            </a:r>
+            <a:endParaRPr lang="pt-BR" sz="1200" b="0" i="0" kern="1200" dirty="0" smtClean="0">
+              <a:solidFill>
+                <a:schemeClr val="tx1"/>
+              </a:solidFill>
+              <a:effectLst/>
+              <a:latin typeface="+mn-lt"/>
+              <a:ea typeface="+mn-ea"/>
+              <a:cs typeface="+mn-cs"/>
+            </a:endParaRPr>
+          </a:p>
+          <a:p>
+            <a:endParaRPr lang="pt-BR" sz="1200" b="0" i="0" kern="1200" smtClean="0">
+              <a:solidFill>
+                <a:schemeClr val="tx1"/>
+              </a:solidFill>
+              <a:effectLst/>
+              <a:latin typeface="+mn-lt"/>
+              <a:ea typeface="+mn-ea"/>
+              <a:cs typeface="+mn-cs"/>
+            </a:endParaRPr>
+          </a:p>
+          <a:p>
+            <a:r>
+              <a:rPr lang="pt-BR" sz="1200" b="0" i="0" kern="1200" smtClean="0">
+                <a:solidFill>
+                  <a:schemeClr val="tx1"/>
+                </a:solidFill>
+                <a:effectLst/>
+                <a:latin typeface="+mn-lt"/>
+                <a:ea typeface="+mn-ea"/>
+                <a:cs typeface="+mn-cs"/>
+              </a:rPr>
+              <a:t>Explicar </a:t>
+            </a:r>
+            <a:r>
+              <a:rPr lang="pt-BR" sz="1200" b="0" i="0" kern="1200" dirty="0" smtClean="0">
+                <a:solidFill>
+                  <a:schemeClr val="tx1"/>
+                </a:solidFill>
+                <a:effectLst/>
+                <a:latin typeface="+mn-lt"/>
+                <a:ea typeface="+mn-ea"/>
+                <a:cs typeface="+mn-cs"/>
+              </a:rPr>
+              <a:t>o </a:t>
+            </a:r>
+            <a:r>
+              <a:rPr lang="pt-BR" sz="1200" b="0" i="0" kern="1200" dirty="0" err="1" smtClean="0">
+                <a:solidFill>
+                  <a:schemeClr val="tx1"/>
+                </a:solidFill>
+                <a:effectLst/>
+                <a:latin typeface="+mn-lt"/>
+                <a:ea typeface="+mn-ea"/>
+                <a:cs typeface="+mn-cs"/>
+              </a:rPr>
+              <a:t>delay</a:t>
+            </a:r>
+            <a:r>
+              <a:rPr lang="pt-BR" sz="1200" b="0" i="0" kern="1200" dirty="0" smtClean="0">
+                <a:solidFill>
+                  <a:schemeClr val="tx1"/>
+                </a:solidFill>
+                <a:effectLst/>
+                <a:latin typeface="+mn-lt"/>
+                <a:ea typeface="+mn-ea"/>
+                <a:cs typeface="+mn-cs"/>
+              </a:rPr>
+              <a:t> entre o resultado da validação automática e a sinalização do </a:t>
+            </a:r>
+            <a:r>
+              <a:rPr lang="pt-BR" sz="1200" b="0" i="0" kern="1200" dirty="0" err="1" smtClean="0">
+                <a:solidFill>
+                  <a:schemeClr val="tx1"/>
+                </a:solidFill>
+                <a:effectLst/>
+                <a:latin typeface="+mn-lt"/>
+                <a:ea typeface="+mn-ea"/>
+                <a:cs typeface="+mn-cs"/>
+              </a:rPr>
+              <a:t>badge</a:t>
+            </a:r>
+            <a:r>
+              <a:rPr lang="pt-BR" sz="1200" b="0" i="0" kern="1200" dirty="0" smtClean="0">
+                <a:solidFill>
+                  <a:schemeClr val="tx1"/>
+                </a:solidFill>
+                <a:effectLst/>
+                <a:latin typeface="+mn-lt"/>
+                <a:ea typeface="+mn-ea"/>
+                <a:cs typeface="+mn-cs"/>
+              </a:rPr>
+              <a:t> de validação</a:t>
+            </a:r>
+          </a:p>
+          <a:p>
+            <a:endParaRPr lang="pt-BR" dirty="0" smtClean="0"/>
+          </a:p>
+          <a:p>
+            <a:endParaRPr lang="pt-BR" dirty="0" smtClean="0"/>
+          </a:p>
+          <a:p>
+            <a:r>
+              <a:rPr lang="pt-BR" dirty="0" smtClean="0"/>
+              <a:t>RETOMAR o exemplo da remuneração</a:t>
+            </a:r>
+            <a:r>
+              <a:rPr lang="pt-BR" baseline="0" dirty="0" smtClean="0"/>
+              <a:t> – leiaute arquivo, mudanças colunas, tipo variáveis, </a:t>
+            </a:r>
+            <a:r>
+              <a:rPr lang="pt-BR" baseline="0" dirty="0" err="1" smtClean="0"/>
+              <a:t>etc</a:t>
+            </a:r>
+            <a:endParaRPr lang="pt-BR" baseline="0" dirty="0" smtClean="0"/>
+          </a:p>
+          <a:p>
+            <a:endParaRPr lang="pt-BR" baseline="0" dirty="0" smtClean="0"/>
+          </a:p>
+          <a:p>
+            <a:r>
+              <a:rPr lang="pt-BR" sz="1200" b="1" i="0" u="none" strike="noStrike" kern="1200" dirty="0" smtClean="0">
+                <a:solidFill>
+                  <a:schemeClr val="tx1"/>
+                </a:solidFill>
+                <a:effectLst/>
+                <a:latin typeface="+mn-lt"/>
+                <a:ea typeface="+mn-ea"/>
+                <a:cs typeface="+mn-cs"/>
+                <a:hlinkClick r:id="rId5"/>
+              </a:rPr>
+              <a:t>Especificação do </a:t>
+            </a:r>
+            <a:r>
+              <a:rPr lang="pt-BR" sz="1200" b="1" i="0" u="none" strike="noStrike" kern="1200" dirty="0" err="1" smtClean="0">
+                <a:solidFill>
+                  <a:schemeClr val="tx1"/>
+                </a:solidFill>
+                <a:effectLst/>
+                <a:latin typeface="+mn-lt"/>
+                <a:ea typeface="+mn-ea"/>
+                <a:cs typeface="+mn-cs"/>
+                <a:hlinkClick r:id="rId5"/>
+              </a:rPr>
+              <a:t>csv</a:t>
+            </a:r>
+            <a:r>
+              <a:rPr lang="pt-BR" sz="1200" b="1" i="0" u="none" strike="noStrike" kern="1200" dirty="0" smtClean="0">
+                <a:solidFill>
+                  <a:schemeClr val="tx1"/>
+                </a:solidFill>
+                <a:effectLst/>
+                <a:latin typeface="+mn-lt"/>
+                <a:ea typeface="+mn-ea"/>
+                <a:cs typeface="+mn-cs"/>
+              </a:rPr>
+              <a:t>: </a:t>
+            </a:r>
+            <a:r>
+              <a:rPr lang="pt-BR" sz="1200" b="0" i="0" u="none" strike="noStrike" kern="1200" dirty="0" smtClean="0">
+                <a:solidFill>
+                  <a:schemeClr val="tx1"/>
+                </a:solidFill>
+                <a:effectLst/>
+                <a:latin typeface="+mn-lt"/>
+                <a:ea typeface="+mn-ea"/>
+                <a:cs typeface="+mn-cs"/>
+                <a:hlinkClick r:id="rId6"/>
+              </a:rPr>
+              <a:t>CSV </a:t>
+            </a:r>
+            <a:r>
+              <a:rPr lang="pt-BR" sz="1200" b="0" i="0" u="none" strike="noStrike" kern="1200" dirty="0" err="1" smtClean="0">
+                <a:solidFill>
+                  <a:schemeClr val="tx1"/>
+                </a:solidFill>
+                <a:effectLst/>
+                <a:latin typeface="+mn-lt"/>
+                <a:ea typeface="+mn-ea"/>
+                <a:cs typeface="+mn-cs"/>
+                <a:hlinkClick r:id="rId6"/>
+              </a:rPr>
+              <a:t>dialect</a:t>
+            </a:r>
+            <a:r>
+              <a:rPr lang="pt-BR" sz="1200" b="0" i="0" u="none" strike="noStrike" kern="1200" dirty="0" smtClean="0">
+                <a:solidFill>
+                  <a:schemeClr val="tx1"/>
+                </a:solidFill>
+                <a:effectLst/>
+                <a:latin typeface="+mn-lt"/>
+                <a:ea typeface="+mn-ea"/>
+                <a:cs typeface="+mn-cs"/>
+                <a:hlinkClick r:id="rId6"/>
+              </a:rPr>
+              <a:t> </a:t>
+            </a:r>
+            <a:r>
+              <a:rPr lang="pt-BR" sz="1200" b="0" i="0" u="none" strike="noStrike" kern="1200" dirty="0" err="1" smtClean="0">
+                <a:solidFill>
+                  <a:schemeClr val="tx1"/>
+                </a:solidFill>
+                <a:effectLst/>
+                <a:latin typeface="+mn-lt"/>
+                <a:ea typeface="+mn-ea"/>
+                <a:cs typeface="+mn-cs"/>
+                <a:hlinkClick r:id="rId6"/>
               </a:rPr>
               <a:t>descriptor</a:t>
             </a:r>
@@ -3089,15 +3397,7 @@
                   <a:srgbClr val="172B4D"/>
                 </a:solidFill>
               </a:rPr>
-              <a:t>V </a:t>
-            </a:r>
-            <a:r>
-              <a:rPr lang="pt-BR" altLang="pt-BR" dirty="0" smtClean="0">
-                <a:solidFill>
-                  <a:srgbClr val="172B4D"/>
-                </a:solidFill>
-              </a:rPr>
-              <a:t>- garantir a </a:t>
+              <a:t>V - garantir a </a:t>
             </a:r>
             <a:r>
               <a:rPr lang="pt-BR" altLang="pt-BR" b="1" u="sng" dirty="0" smtClean="0">
@@ -3144,27 +3444,11 @@
           <a:p>
             <a:r>
               <a:rPr lang="pt-BR" dirty="0" smtClean="0"/>
-              <a:t>(Autenticidade</a:t>
-            </a:r>
-            <a:r>
-              <a:rPr lang="pt-BR" dirty="0" smtClean="0"/>
-              <a:t>: conjunto de ferramentas </a:t>
-            </a:r>
-            <a:r>
-              <a:rPr lang="pt-BR" dirty="0" smtClean="0"/>
-              <a:t>de marcação </a:t>
-            </a:r>
-            <a:r>
-              <a:rPr lang="pt-BR" dirty="0" smtClean="0"/>
-              <a:t>do arquivo</a:t>
+              <a:t>(Autenticidade: conjunto de ferramentas de marcação do arquivo</a:t>
             </a:r>
             <a:r>
               <a:rPr lang="pt-BR" baseline="0" dirty="0" smtClean="0"/>
-              <a:t> com uma chave </a:t>
-            </a:r>
-            <a:r>
-              <a:rPr lang="pt-BR" baseline="0" dirty="0" smtClean="0"/>
-              <a:t>digital); Integridade ~ meios físicos/</a:t>
+              <a:t> com uma chave digital); Integridade ~ meios físicos/</a:t>
             </a:r>
             <a:r>
               <a:rPr lang="pt-BR" baseline="0" dirty="0" err="1" smtClean="0"/>
@@ -3193,15 +3477,7 @@
                   <a:srgbClr val="172B4D"/>
                 </a:solidFill>
               </a:rPr>
-              <a:t>VI </a:t>
-            </a:r>
-            <a:r>
-              <a:rPr lang="pt-BR" altLang="pt-BR" dirty="0" smtClean="0">
-                <a:solidFill>
-                  <a:srgbClr val="172B4D"/>
-                </a:solidFill>
-              </a:rPr>
-              <a:t>- manter </a:t>
+              <a:t>VI - manter </a:t>
             </a:r>
             <a:r>
               <a:rPr lang="pt-BR" altLang="pt-BR" b="1" u="sng" dirty="0" smtClean="0">
@@ -9713,15 +9989,7 @@
                   <a:srgbClr val="172B4D"/>
                 </a:solidFill>
               </a:rPr>
-              <a:t>O </a:t>
-            </a:r>
-            <a:r>
-              <a:rPr lang="pt-BR" altLang="pt-BR" dirty="0" smtClean="0">
-                <a:solidFill>
-                  <a:srgbClr val="172B4D"/>
-                </a:solidFill>
-              </a:rPr>
-              <a:t>QUE? </a:t>
+              <a:t>O QUE? </a:t>
             </a:r>
           </a:p>
           <a:p>
@@ -9810,21 +10078,8 @@
                   <a:srgbClr val="172B4D"/>
                 </a:solidFill>
               </a:rPr>
-              <a:t>COMO</a:t>
-            </a:r>
-            <a:r>
-              <a:rPr lang="pt-BR" altLang="pt-BR" dirty="0" smtClean="0">
-                <a:solidFill>
-                  <a:srgbClr val="172B4D"/>
-                </a:solidFill>
-              </a:rPr>
-              <a:t>? </a:t>
-            </a:r>
-            <a:endParaRPr lang="pt-BR" altLang="pt-BR" dirty="0" smtClean="0">
-              <a:solidFill>
-                <a:srgbClr val="172B4D"/>
-              </a:solidFill>
-            </a:endParaRPr>
+              <a:t>COMO? </a:t>
+            </a:r>
           </a:p>
           <a:p>
             <a:pPr lvl="0" eaLnBrk="0" fontAlgn="base" hangingPunct="0">
@@ -9844,23 +10099,7 @@
                   <a:srgbClr val="172B4D"/>
                 </a:solidFill>
               </a:rPr>
-              <a:t>Uso </a:t>
-            </a:r>
-            <a:r>
-              <a:rPr lang="pt-BR" altLang="pt-BR" dirty="0" smtClean="0">
-                <a:solidFill>
-                  <a:srgbClr val="172B4D"/>
-                </a:solidFill>
-              </a:rPr>
-              <a:t>de aplicativos online </a:t>
-            </a:r>
-            <a:r>
-              <a:rPr lang="pt-BR" altLang="pt-BR" dirty="0" smtClean="0">
-                <a:solidFill>
-                  <a:srgbClr val="172B4D"/>
-                </a:solidFill>
-              </a:rPr>
-              <a:t>e sua relação com conceitos e boas práticas de dados abertos</a:t>
+              <a:t>Uso de aplicativos online e sua relação com conceitos e boas práticas de dados abertos</a:t>
             </a:r>
           </a:p>
           <a:p>
@@ -9901,11 +10140,6 @@
               </a:rPr>
               <a:t>EXPECTATIVAS:</a:t>
             </a:r>
-            <a:endParaRPr lang="pt-BR" altLang="pt-BR" dirty="0" smtClean="0">
-              <a:solidFill>
-                <a:srgbClr val="172B4D"/>
-              </a:solidFill>
-            </a:endParaRPr>
           </a:p>
           <a:p>
             <a:pPr marL="1714500" lvl="3" indent="-342900" eaLnBrk="0" fontAlgn="base" hangingPunct="0">
@@ -10733,7 +10967,7 @@
           <a:graphicData uri="http://schemas.openxmlformats.org/presentationml/2006/ole">
             <mc:AlternateContent xmlns:mc="http://schemas.openxmlformats.org/markup-compatibility/2006">
               <mc:Choice xmlns:v="urn:schemas-microsoft-com:vml" Requires="v">
-                <p:oleObj spid="_x0000_s2051" name="Planilha" r:id="rId4" imgW="9153525" imgH="1724025" progId="Excel.Sheet.12">
+                <p:oleObj spid="_x0000_s2052" name="Planilha" r:id="rId4" imgW="9153525" imgH="1724025" progId="Excel.Sheet.12">
                   <p:embed/>
                 </p:oleObj>
               </mc:Choice>
@@ -12275,31 +12509,7 @@
                   <a:srgbClr val="172B4D"/>
                 </a:solidFill>
               </a:rPr>
-              <a:t>a) No </a:t>
-            </a:r>
-            <a:r>
-              <a:rPr lang="pt-BR" dirty="0" smtClean="0">
-                <a:solidFill>
-                  <a:srgbClr val="172B4D"/>
-                </a:solidFill>
-              </a:rPr>
-              <a:t>painel </a:t>
-            </a:r>
-            <a:r>
-              <a:rPr lang="pt-BR" dirty="0" smtClean="0">
-                <a:solidFill>
-                  <a:srgbClr val="172B4D"/>
-                </a:solidFill>
-              </a:rPr>
-              <a:t>à </a:t>
-            </a:r>
-            <a:r>
-              <a:rPr lang="pt-BR" dirty="0" smtClean="0">
-                <a:solidFill>
-                  <a:srgbClr val="172B4D"/>
-                </a:solidFill>
-              </a:rPr>
-              <a:t>esquerda: o </a:t>
+              <a:t>a) No painel à esquerda: o </a:t>
             </a:r>
             <a:r>
               <a:rPr lang="pt-BR" dirty="0">
@@ -12435,15 +12645,7 @@
                   <a:srgbClr val="172B4D"/>
                 </a:solidFill>
               </a:rPr>
-              <a:t>conjunto</a:t>
-            </a:r>
-            <a:r>
-              <a:rPr lang="pt-BR" dirty="0" smtClean="0">
-                <a:solidFill>
-                  <a:srgbClr val="172B4D"/>
-                </a:solidFill>
-              </a:rPr>
-              <a:t>:</a:t>
+              <a:t>conjunto:</a:t>
             </a:r>
           </a:p>
           <a:p>
@@ -13580,15 +13782,7 @@
                   <a:srgbClr val="172B4D"/>
                 </a:solidFill>
               </a:rPr>
-              <a:t> </a:t>
-            </a:r>
-            <a:r>
-              <a:rPr lang="pt-BR" altLang="pt-BR" dirty="0" smtClean="0">
-                <a:solidFill>
-                  <a:srgbClr val="172B4D"/>
-                </a:solidFill>
-              </a:rPr>
-              <a:t>de validação</a:t>
+              <a:t> de validação</a:t>
             </a:r>
           </a:p>
           <a:p>
@@ -13853,16 +14047,7 @@
                 </a:solidFill>
                 <a:hlinkClick r:id="rId3"/>
               </a:rPr>
-              <a:t>Lei de Acesso à Informação (12527/2011) </a:t>
-            </a:r>
-            <a:r>
-              <a:rPr lang="pt-BR" altLang="pt-BR" dirty="0" smtClean="0">
-                <a:solidFill>
-                  <a:srgbClr val="172B4D"/>
-                </a:solidFill>
-                <a:hlinkClick r:id="rId3"/>
-              </a:rPr>
-              <a:t>art. 8º </a:t>
+              <a:t>Lei de Acesso à Informação (12527/2011) art. 8º </a:t>
             </a:r>
             <a:endParaRPr lang="pt-BR" altLang="pt-BR" dirty="0" smtClean="0">
               <a:solidFill>
@@ -14433,15 +14618,7 @@
                   <a:srgbClr val="172B4D"/>
                 </a:solidFill>
               </a:rPr>
-              <a:t>Dados </a:t>
-            </a:r>
-            <a:r>
-              <a:rPr lang="pt-BR" altLang="pt-BR" dirty="0" smtClean="0">
-                <a:solidFill>
-                  <a:srgbClr val="172B4D"/>
-                </a:solidFill>
-              </a:rPr>
-              <a:t>Abertos </a:t>
+              <a:t>Dados Abertos </a:t>
             </a:r>
             <a:r>
               <a:rPr lang="pt-BR" altLang="pt-BR" dirty="0">
@@ -14968,15 +15145,7 @@
                   <a:srgbClr val="002060"/>
                 </a:solidFill>
               </a:rPr>
-              <a:t>O que fizemos</a:t>
-            </a:r>
-            <a:r>
-              <a:rPr lang="pt-BR" b="1" dirty="0" smtClean="0">
-                <a:solidFill>
-                  <a:srgbClr val="002060"/>
-                </a:solidFill>
-              </a:rPr>
-              <a:t>?</a:t>
+              <a:t>O que fizemos?</a:t>
             </a:r>
           </a:p>
           <a:p>
@@ -14990,15 +15159,7 @@
                   <a:srgbClr val="002060"/>
                 </a:solidFill>
               </a:rPr>
-              <a:t>Conjunto </a:t>
-            </a:r>
-            <a:r>
-              <a:rPr lang="pt-BR" dirty="0" smtClean="0">
-                <a:solidFill>
-                  <a:srgbClr val="002060"/>
-                </a:solidFill>
-              </a:rPr>
-              <a:t>de dados através do </a:t>
+              <a:t>Conjunto de dados através do </a:t>
             </a:r>
             <a:r>
               <a:rPr lang="pt-BR" i="1" dirty="0" err="1" smtClean="0">
@@ -15066,15 +15227,7 @@
                   <a:srgbClr val="002060"/>
                 </a:solidFill>
               </a:rPr>
-              <a:t>utilizando uma </a:t>
-            </a:r>
-            <a:r>
-              <a:rPr lang="pt-BR" dirty="0" smtClean="0">
-                <a:solidFill>
-                  <a:srgbClr val="002060"/>
-                </a:solidFill>
-              </a:rPr>
-              <a:t>especificação</a:t>
+              <a:t>utilizando uma especificação</a:t>
             </a:r>
           </a:p>
           <a:p>
@@ -15104,15 +15257,7 @@
                   <a:srgbClr val="002060"/>
                 </a:solidFill>
               </a:rPr>
-              <a:t> criado para </a:t>
-            </a:r>
-            <a:r>
-              <a:rPr lang="pt-BR" dirty="0" smtClean="0">
-                <a:solidFill>
-                  <a:srgbClr val="002060"/>
-                </a:solidFill>
-              </a:rPr>
-              <a:t>controle de alteração no </a:t>
+              <a:t> criado para controle de alteração no </a:t>
             </a:r>
             <a:r>
               <a:rPr lang="pt-BR" i="1" dirty="0" err="1" smtClean="0">
@@ -15139,47 +15284,7 @@
                   <a:srgbClr val="002060"/>
                 </a:solidFill>
               </a:rPr>
-              <a:t>Validação </a:t>
-            </a:r>
-            <a:r>
-              <a:rPr lang="pt-BR" dirty="0" smtClean="0">
-                <a:solidFill>
-                  <a:srgbClr val="002060"/>
-                </a:solidFill>
-              </a:rPr>
-              <a:t>automática dos dados </a:t>
-            </a:r>
-            <a:r>
-              <a:rPr lang="pt-BR" dirty="0" smtClean="0">
-                <a:solidFill>
-                  <a:srgbClr val="002060"/>
-                </a:solidFill>
-              </a:rPr>
-              <a:t>pela </a:t>
-            </a:r>
-            <a:r>
-              <a:rPr lang="pt-BR" dirty="0" smtClean="0">
-                <a:solidFill>
-                  <a:srgbClr val="002060"/>
-                </a:solidFill>
-              </a:rPr>
-              <a:t>sincronização do repositório </a:t>
-            </a:r>
-            <a:r>
-              <a:rPr lang="pt-BR" dirty="0" smtClean="0">
-                <a:solidFill>
-                  <a:srgbClr val="002060"/>
-                </a:solidFill>
-              </a:rPr>
-              <a:t>com </a:t>
-            </a:r>
-            <a:r>
-              <a:rPr lang="pt-BR" dirty="0" smtClean="0">
-                <a:solidFill>
-                  <a:srgbClr val="002060"/>
-                </a:solidFill>
-              </a:rPr>
-              <a:t>o </a:t>
+              <a:t>Validação automática dos dados pela sincronização do repositório com o </a:t>
             </a:r>
             <a:r>
               <a:rPr lang="pt-BR" i="1" dirty="0" err="1" smtClean="0">
@@ -15281,11 +15386,6 @@
               </a:rPr>
               <a:t>Para quê? </a:t>
             </a:r>
-            <a:endParaRPr lang="pt-BR" b="1" dirty="0" smtClean="0">
-              <a:solidFill>
-                <a:srgbClr val="002060"/>
-              </a:solidFill>
-            </a:endParaRPr>
           </a:p>
           <a:p>
             <a:r>
@@ -15302,38 +15402,17 @@
                   <a:srgbClr val="002060"/>
                 </a:solidFill>
               </a:rPr>
-              <a:t>umentar </a:t>
-            </a:r>
+              <a:t>umentar a chance do uso dos dados e os benefícios desse uso como retornos em escala para a própria sociedade. </a:t>
+            </a:r>
+          </a:p>
+          <a:p>
             <a:r>
               <a:rPr lang="pt-BR" dirty="0" smtClean="0">
                 <a:solidFill>
                   <a:srgbClr val="002060"/>
                 </a:solidFill>
               </a:rPr>
-              <a:t>a chance do uso dos dados e os benefícios desse uso como retornos em escala para a própria sociedade. </a:t>
-            </a:r>
-            <a:endParaRPr lang="pt-BR" dirty="0" smtClean="0">
-              <a:solidFill>
-                <a:srgbClr val="002060"/>
-              </a:solidFill>
-            </a:endParaRPr>
-          </a:p>
-          <a:p>
-            <a:r>
-              <a:rPr lang="pt-BR" dirty="0" smtClean="0">
-                <a:solidFill>
-                  <a:srgbClr val="002060"/>
-                </a:solidFill>
-              </a:rPr>
-              <a:t>Indução </a:t>
-            </a:r>
-            <a:r>
-              <a:rPr lang="pt-BR" dirty="0" smtClean="0">
-                <a:solidFill>
-                  <a:srgbClr val="002060"/>
-                </a:solidFill>
-              </a:rPr>
-              <a:t>de uma cultura de colaboração e </a:t>
+              <a:t>Indução de uma cultura de colaboração e </a:t>
             </a:r>
             <a:r>
               <a:rPr lang="pt-BR" i="1" dirty="0" smtClean="0">

</xml_diff>